<commit_message>
claus besprechung und bilder besser exportiert
</commit_message>
<xml_diff>
--- a/images/ppt/graphics.pptx
+++ b/images/ppt/graphics.pptx
@@ -216,7 +216,7 @@
           <a:p>
             <a:fld id="{188F6163-F954-4171-86F8-919C3805A43A}" type="datetimeFigureOut">
               <a:rPr lang="de-DE" smtClean="0"/>
-              <a:t>26.01.2017</a:t>
+              <a:t>31.01.2017</a:t>
             </a:fld>
             <a:endParaRPr lang="de-DE"/>
           </a:p>
@@ -2423,7 +2423,7 @@
           <a:p>
             <a:fld id="{6E727812-5F0F-454E-BB06-65ACDB23CEDF}" type="datetimeFigureOut">
               <a:rPr lang="de-DE" smtClean="0"/>
-              <a:t>26.01.2017</a:t>
+              <a:t>31.01.2017</a:t>
             </a:fld>
             <a:endParaRPr lang="de-DE"/>
           </a:p>
@@ -2600,7 +2600,7 @@
           <a:p>
             <a:fld id="{6E727812-5F0F-454E-BB06-65ACDB23CEDF}" type="datetimeFigureOut">
               <a:rPr lang="de-DE" smtClean="0"/>
-              <a:t>26.01.2017</a:t>
+              <a:t>31.01.2017</a:t>
             </a:fld>
             <a:endParaRPr lang="de-DE"/>
           </a:p>
@@ -2780,7 +2780,7 @@
           <a:p>
             <a:fld id="{6E727812-5F0F-454E-BB06-65ACDB23CEDF}" type="datetimeFigureOut">
               <a:rPr lang="de-DE" smtClean="0"/>
-              <a:t>26.01.2017</a:t>
+              <a:t>31.01.2017</a:t>
             </a:fld>
             <a:endParaRPr lang="de-DE"/>
           </a:p>
@@ -2950,7 +2950,7 @@
           <a:p>
             <a:fld id="{6E727812-5F0F-454E-BB06-65ACDB23CEDF}" type="datetimeFigureOut">
               <a:rPr lang="de-DE" smtClean="0"/>
-              <a:t>26.01.2017</a:t>
+              <a:t>31.01.2017</a:t>
             </a:fld>
             <a:endParaRPr lang="de-DE"/>
           </a:p>
@@ -3194,7 +3194,7 @@
           <a:p>
             <a:fld id="{6E727812-5F0F-454E-BB06-65ACDB23CEDF}" type="datetimeFigureOut">
               <a:rPr lang="de-DE" smtClean="0"/>
-              <a:t>26.01.2017</a:t>
+              <a:t>31.01.2017</a:t>
             </a:fld>
             <a:endParaRPr lang="de-DE"/>
           </a:p>
@@ -3426,7 +3426,7 @@
           <a:p>
             <a:fld id="{6E727812-5F0F-454E-BB06-65ACDB23CEDF}" type="datetimeFigureOut">
               <a:rPr lang="de-DE" smtClean="0"/>
-              <a:t>26.01.2017</a:t>
+              <a:t>31.01.2017</a:t>
             </a:fld>
             <a:endParaRPr lang="de-DE"/>
           </a:p>
@@ -3793,7 +3793,7 @@
           <a:p>
             <a:fld id="{6E727812-5F0F-454E-BB06-65ACDB23CEDF}" type="datetimeFigureOut">
               <a:rPr lang="de-DE" smtClean="0"/>
-              <a:t>26.01.2017</a:t>
+              <a:t>31.01.2017</a:t>
             </a:fld>
             <a:endParaRPr lang="de-DE"/>
           </a:p>
@@ -3911,7 +3911,7 @@
           <a:p>
             <a:fld id="{6E727812-5F0F-454E-BB06-65ACDB23CEDF}" type="datetimeFigureOut">
               <a:rPr lang="de-DE" smtClean="0"/>
-              <a:t>26.01.2017</a:t>
+              <a:t>31.01.2017</a:t>
             </a:fld>
             <a:endParaRPr lang="de-DE"/>
           </a:p>
@@ -4006,7 +4006,7 @@
           <a:p>
             <a:fld id="{6E727812-5F0F-454E-BB06-65ACDB23CEDF}" type="datetimeFigureOut">
               <a:rPr lang="de-DE" smtClean="0"/>
-              <a:t>26.01.2017</a:t>
+              <a:t>31.01.2017</a:t>
             </a:fld>
             <a:endParaRPr lang="de-DE"/>
           </a:p>
@@ -4283,7 +4283,7 @@
           <a:p>
             <a:fld id="{6E727812-5F0F-454E-BB06-65ACDB23CEDF}" type="datetimeFigureOut">
               <a:rPr lang="de-DE" smtClean="0"/>
-              <a:t>26.01.2017</a:t>
+              <a:t>31.01.2017</a:t>
             </a:fld>
             <a:endParaRPr lang="de-DE"/>
           </a:p>
@@ -4540,7 +4540,7 @@
           <a:p>
             <a:fld id="{6E727812-5F0F-454E-BB06-65ACDB23CEDF}" type="datetimeFigureOut">
               <a:rPr lang="de-DE" smtClean="0"/>
-              <a:t>26.01.2017</a:t>
+              <a:t>31.01.2017</a:t>
             </a:fld>
             <a:endParaRPr lang="de-DE"/>
           </a:p>
@@ -4753,7 +4753,7 @@
           <a:p>
             <a:fld id="{6E727812-5F0F-454E-BB06-65ACDB23CEDF}" type="datetimeFigureOut">
               <a:rPr lang="de-DE" smtClean="0"/>
-              <a:t>26.01.2017</a:t>
+              <a:t>31.01.2017</a:t>
             </a:fld>
             <a:endParaRPr lang="de-DE"/>
           </a:p>
@@ -17827,13 +17827,6 @@
                 <a:solidFill>
                   <a:schemeClr val="accent1"/>
                 </a:solidFill>
-                <a:effectLst>
-                  <a:outerShdw blurRad="38100" dist="25400" dir="5400000" algn="ctr" rotWithShape="0">
-                    <a:srgbClr val="6E747A">
-                      <a:alpha val="43000"/>
-                    </a:srgbClr>
-                  </a:outerShdw>
-                </a:effectLst>
               </a:rPr>
               <a:t>GET  /</a:t>
             </a:r>
@@ -17843,13 +17836,6 @@
                 <a:solidFill>
                   <a:schemeClr val="accent1"/>
                 </a:solidFill>
-                <a:effectLst>
-                  <a:outerShdw blurRad="38100" dist="25400" dir="5400000" algn="ctr" rotWithShape="0">
-                    <a:srgbClr val="6E747A">
-                      <a:alpha val="43000"/>
-                    </a:srgbClr>
-                  </a:outerShdw>
-                </a:effectLst>
               </a:rPr>
               <a:t>movieservice</a:t>
             </a:r>
@@ -17859,13 +17845,6 @@
                 <a:solidFill>
                   <a:schemeClr val="accent1"/>
                 </a:solidFill>
-                <a:effectLst>
-                  <a:outerShdw blurRad="38100" dist="25400" dir="5400000" algn="ctr" rotWithShape="0">
-                    <a:srgbClr val="6E747A">
-                      <a:alpha val="43000"/>
-                    </a:srgbClr>
-                  </a:outerShdw>
-                </a:effectLst>
               </a:rPr>
               <a:t>/</a:t>
             </a:r>
@@ -17875,13 +17854,6 @@
                 <a:solidFill>
                   <a:schemeClr val="accent1"/>
                 </a:solidFill>
-                <a:effectLst>
-                  <a:outerShdw blurRad="38100" dist="25400" dir="5400000" algn="ctr" rotWithShape="0">
-                    <a:srgbClr val="6E747A">
-                      <a:alpha val="43000"/>
-                    </a:srgbClr>
-                  </a:outerShdw>
-                </a:effectLst>
               </a:rPr>
               <a:t>movies</a:t>
             </a:r>
@@ -17891,13 +17863,6 @@
                 <a:solidFill>
                   <a:schemeClr val="accent1"/>
                 </a:solidFill>
-                <a:effectLst>
-                  <a:outerShdw blurRad="38100" dist="25400" dir="5400000" algn="ctr" rotWithShape="0">
-                    <a:srgbClr val="6E747A">
-                      <a:alpha val="43000"/>
-                    </a:srgbClr>
-                  </a:outerShdw>
-                </a:effectLst>
               </a:rPr>
               <a:t>/MV004</a:t>
             </a:r>
@@ -17906,13 +17871,6 @@
               <a:solidFill>
                 <a:schemeClr val="accent1"/>
               </a:solidFill>
-              <a:effectLst>
-                <a:outerShdw blurRad="38100" dist="25400" dir="5400000" algn="ctr" rotWithShape="0">
-                  <a:srgbClr val="6E747A">
-                    <a:alpha val="43000"/>
-                  </a:srgbClr>
-                </a:outerShdw>
-              </a:effectLst>
             </a:endParaRPr>
           </a:p>
         </p:txBody>
@@ -18213,13 +18171,6 @@
                 <a:solidFill>
                   <a:schemeClr val="accent2"/>
                 </a:solidFill>
-                <a:effectLst>
-                  <a:outerShdw blurRad="38100" dist="25400" dir="5400000" algn="ctr" rotWithShape="0">
-                    <a:srgbClr val="6E747A">
-                      <a:alpha val="43000"/>
-                    </a:srgbClr>
-                  </a:outerShdw>
-                </a:effectLst>
               </a:rPr>
               <a:t>HTTP/1.1 200 OK</a:t>
             </a:r>
@@ -18230,13 +18181,6 @@
               <a:solidFill>
                 <a:schemeClr val="accent2"/>
               </a:solidFill>
-              <a:effectLst>
-                <a:outerShdw blurRad="38100" dist="25400" dir="5400000" algn="ctr" rotWithShape="0">
-                  <a:srgbClr val="6E747A">
-                    <a:alpha val="43000"/>
-                  </a:srgbClr>
-                </a:outerShdw>
-              </a:effectLst>
             </a:endParaRPr>
           </a:p>
           <a:p>
@@ -18246,13 +18190,6 @@
                 <a:solidFill>
                   <a:schemeClr val="accent2"/>
                 </a:solidFill>
-                <a:effectLst>
-                  <a:outerShdw blurRad="38100" dist="25400" dir="5400000" algn="ctr" rotWithShape="0">
-                    <a:srgbClr val="6E747A">
-                      <a:alpha val="43000"/>
-                    </a:srgbClr>
-                  </a:outerShdw>
-                </a:effectLst>
               </a:rPr>
               <a:t>&lt;?</a:t>
             </a:r>
@@ -18262,13 +18199,6 @@
                 <a:solidFill>
                   <a:schemeClr val="accent2"/>
                 </a:solidFill>
-                <a:effectLst>
-                  <a:outerShdw blurRad="38100" dist="25400" dir="5400000" algn="ctr" rotWithShape="0">
-                    <a:srgbClr val="6E747A">
-                      <a:alpha val="43000"/>
-                    </a:srgbClr>
-                  </a:outerShdw>
-                </a:effectLst>
               </a:rPr>
               <a:t>xml</a:t>
             </a:r>
@@ -18278,13 +18208,6 @@
                 <a:solidFill>
                   <a:schemeClr val="accent2"/>
                 </a:solidFill>
-                <a:effectLst>
-                  <a:outerShdw blurRad="38100" dist="25400" dir="5400000" algn="ctr" rotWithShape="0">
-                    <a:srgbClr val="6E747A">
-                      <a:alpha val="43000"/>
-                    </a:srgbClr>
-                  </a:outerShdw>
-                </a:effectLst>
               </a:rPr>
               <a:t> </a:t>
             </a:r>
@@ -18294,13 +18217,6 @@
                 <a:solidFill>
                   <a:schemeClr val="accent2"/>
                 </a:solidFill>
-                <a:effectLst>
-                  <a:outerShdw blurRad="38100" dist="25400" dir="5400000" algn="ctr" rotWithShape="0">
-                    <a:srgbClr val="6E747A">
-                      <a:alpha val="43000"/>
-                    </a:srgbClr>
-                  </a:outerShdw>
-                </a:effectLst>
               </a:rPr>
               <a:t>version</a:t>
             </a:r>
@@ -18310,13 +18226,6 @@
                 <a:solidFill>
                   <a:schemeClr val="accent2"/>
                 </a:solidFill>
-                <a:effectLst>
-                  <a:outerShdw blurRad="38100" dist="25400" dir="5400000" algn="ctr" rotWithShape="0">
-                    <a:srgbClr val="6E747A">
-                      <a:alpha val="43000"/>
-                    </a:srgbClr>
-                  </a:outerShdw>
-                </a:effectLst>
               </a:rPr>
               <a:t>=„1.0“ </a:t>
             </a:r>
@@ -18326,13 +18235,6 @@
                 <a:solidFill>
                   <a:schemeClr val="accent2"/>
                 </a:solidFill>
-                <a:effectLst>
-                  <a:outerShdw blurRad="38100" dist="25400" dir="5400000" algn="ctr" rotWithShape="0">
-                    <a:srgbClr val="6E747A">
-                      <a:alpha val="43000"/>
-                    </a:srgbClr>
-                  </a:outerShdw>
-                </a:effectLst>
               </a:rPr>
               <a:t>encoding</a:t>
             </a:r>
@@ -18342,13 +18244,6 @@
                 <a:solidFill>
                   <a:schemeClr val="accent2"/>
                 </a:solidFill>
-                <a:effectLst>
-                  <a:outerShdw blurRad="38100" dist="25400" dir="5400000" algn="ctr" rotWithShape="0">
-                    <a:srgbClr val="6E747A">
-                      <a:alpha val="43000"/>
-                    </a:srgbClr>
-                  </a:outerShdw>
-                </a:effectLst>
               </a:rPr>
               <a:t>=„UTF-8“&gt;</a:t>
             </a:r>
@@ -18360,13 +18255,6 @@
                 <a:solidFill>
                   <a:schemeClr val="accent2"/>
                 </a:solidFill>
-                <a:effectLst>
-                  <a:outerShdw blurRad="38100" dist="25400" dir="5400000" algn="ctr" rotWithShape="0">
-                    <a:srgbClr val="6E747A">
-                      <a:alpha val="43000"/>
-                    </a:srgbClr>
-                  </a:outerShdw>
-                </a:effectLst>
               </a:rPr>
               <a:t>&lt;Movie&gt;</a:t>
             </a:r>
@@ -18378,13 +18266,6 @@
                 <a:solidFill>
                   <a:schemeClr val="accent2"/>
                 </a:solidFill>
-                <a:effectLst>
-                  <a:outerShdw blurRad="38100" dist="25400" dir="5400000" algn="ctr" rotWithShape="0">
-                    <a:srgbClr val="6E747A">
-                      <a:alpha val="43000"/>
-                    </a:srgbClr>
-                  </a:outerShdw>
-                </a:effectLst>
               </a:rPr>
               <a:t>	&lt;</a:t>
             </a:r>
@@ -18394,13 +18275,6 @@
                 <a:solidFill>
                   <a:schemeClr val="accent2"/>
                 </a:solidFill>
-                <a:effectLst>
-                  <a:outerShdw blurRad="38100" dist="25400" dir="5400000" algn="ctr" rotWithShape="0">
-                    <a:srgbClr val="6E747A">
-                      <a:alpha val="43000"/>
-                    </a:srgbClr>
-                  </a:outerShdw>
-                </a:effectLst>
               </a:rPr>
               <a:t>director</a:t>
             </a:r>
@@ -18410,13 +18284,6 @@
                 <a:solidFill>
                   <a:schemeClr val="accent2"/>
                 </a:solidFill>
-                <a:effectLst>
-                  <a:outerShdw blurRad="38100" dist="25400" dir="5400000" algn="ctr" rotWithShape="0">
-                    <a:srgbClr val="6E747A">
-                      <a:alpha val="43000"/>
-                    </a:srgbClr>
-                  </a:outerShdw>
-                </a:effectLst>
               </a:rPr>
               <a:t>&gt;Roberto&lt;/</a:t>
             </a:r>
@@ -18426,13 +18293,6 @@
                 <a:solidFill>
                   <a:schemeClr val="accent2"/>
                 </a:solidFill>
-                <a:effectLst>
-                  <a:outerShdw blurRad="38100" dist="25400" dir="5400000" algn="ctr" rotWithShape="0">
-                    <a:srgbClr val="6E747A">
-                      <a:alpha val="43000"/>
-                    </a:srgbClr>
-                  </a:outerShdw>
-                </a:effectLst>
               </a:rPr>
               <a:t>director</a:t>
             </a:r>
@@ -18442,13 +18302,6 @@
                 <a:solidFill>
                   <a:schemeClr val="accent2"/>
                 </a:solidFill>
-                <a:effectLst>
-                  <a:outerShdw blurRad="38100" dist="25400" dir="5400000" algn="ctr" rotWithShape="0">
-                    <a:srgbClr val="6E747A">
-                      <a:alpha val="43000"/>
-                    </a:srgbClr>
-                  </a:outerShdw>
-                </a:effectLst>
               </a:rPr>
               <a:t>&gt;</a:t>
             </a:r>
@@ -18460,13 +18313,6 @@
                 <a:solidFill>
                   <a:schemeClr val="accent2"/>
                 </a:solidFill>
-                <a:effectLst>
-                  <a:outerShdw blurRad="38100" dist="25400" dir="5400000" algn="ctr" rotWithShape="0">
-                    <a:srgbClr val="6E747A">
-                      <a:alpha val="43000"/>
-                    </a:srgbClr>
-                  </a:outerShdw>
-                </a:effectLst>
               </a:rPr>
               <a:t>	&lt;</a:t>
             </a:r>
@@ -18476,13 +18322,6 @@
                 <a:solidFill>
                   <a:schemeClr val="accent2"/>
                 </a:solidFill>
-                <a:effectLst>
-                  <a:outerShdw blurRad="38100" dist="25400" dir="5400000" algn="ctr" rotWithShape="0">
-                    <a:srgbClr val="6E747A">
-                      <a:alpha val="43000"/>
-                    </a:srgbClr>
-                  </a:outerShdw>
-                </a:effectLst>
               </a:rPr>
               <a:t>movieId</a:t>
             </a:r>
@@ -18492,13 +18331,6 @@
                 <a:solidFill>
                   <a:schemeClr val="accent2"/>
                 </a:solidFill>
-                <a:effectLst>
-                  <a:outerShdw blurRad="38100" dist="25400" dir="5400000" algn="ctr" rotWithShape="0">
-                    <a:srgbClr val="6E747A">
-                      <a:alpha val="43000"/>
-                    </a:srgbClr>
-                  </a:outerShdw>
-                </a:effectLst>
               </a:rPr>
               <a:t>&gt;MV004&lt;/</a:t>
             </a:r>
@@ -18508,13 +18340,6 @@
                 <a:solidFill>
                   <a:schemeClr val="accent2"/>
                 </a:solidFill>
-                <a:effectLst>
-                  <a:outerShdw blurRad="38100" dist="25400" dir="5400000" algn="ctr" rotWithShape="0">
-                    <a:srgbClr val="6E747A">
-                      <a:alpha val="43000"/>
-                    </a:srgbClr>
-                  </a:outerShdw>
-                </a:effectLst>
               </a:rPr>
               <a:t>movieId</a:t>
             </a:r>
@@ -18524,13 +18349,6 @@
                 <a:solidFill>
                   <a:schemeClr val="accent2"/>
                 </a:solidFill>
-                <a:effectLst>
-                  <a:outerShdw blurRad="38100" dist="25400" dir="5400000" algn="ctr" rotWithShape="0">
-                    <a:srgbClr val="6E747A">
-                      <a:alpha val="43000"/>
-                    </a:srgbClr>
-                  </a:outerShdw>
-                </a:effectLst>
               </a:rPr>
               <a:t>&gt;</a:t>
             </a:r>
@@ -18542,13 +18360,6 @@
                 <a:solidFill>
                   <a:schemeClr val="accent2"/>
                 </a:solidFill>
-                <a:effectLst>
-                  <a:outerShdw blurRad="38100" dist="25400" dir="5400000" algn="ctr" rotWithShape="0">
-                    <a:srgbClr val="6E747A">
-                      <a:alpha val="43000"/>
-                    </a:srgbClr>
-                  </a:outerShdw>
-                </a:effectLst>
               </a:rPr>
               <a:t>	&lt;title&gt;Life </a:t>
             </a:r>
@@ -18558,13 +18369,6 @@
                 <a:solidFill>
                   <a:schemeClr val="accent2"/>
                 </a:solidFill>
-                <a:effectLst>
-                  <a:outerShdw blurRad="38100" dist="25400" dir="5400000" algn="ctr" rotWithShape="0">
-                    <a:srgbClr val="6E747A">
-                      <a:alpha val="43000"/>
-                    </a:srgbClr>
-                  </a:outerShdw>
-                </a:effectLst>
               </a:rPr>
               <a:t>Is</a:t>
             </a:r>
@@ -18574,13 +18378,6 @@
                 <a:solidFill>
                   <a:schemeClr val="accent2"/>
                 </a:solidFill>
-                <a:effectLst>
-                  <a:outerShdw blurRad="38100" dist="25400" dir="5400000" algn="ctr" rotWithShape="0">
-                    <a:srgbClr val="6E747A">
-                      <a:alpha val="43000"/>
-                    </a:srgbClr>
-                  </a:outerShdw>
-                </a:effectLst>
               </a:rPr>
               <a:t> </a:t>
             </a:r>
@@ -18590,13 +18387,6 @@
                 <a:solidFill>
                   <a:schemeClr val="accent2"/>
                 </a:solidFill>
-                <a:effectLst>
-                  <a:outerShdw blurRad="38100" dist="25400" dir="5400000" algn="ctr" rotWithShape="0">
-                    <a:srgbClr val="6E747A">
-                      <a:alpha val="43000"/>
-                    </a:srgbClr>
-                  </a:outerShdw>
-                </a:effectLst>
               </a:rPr>
               <a:t>Wonderful</a:t>
             </a:r>
@@ -18606,13 +18396,6 @@
                 <a:solidFill>
                   <a:schemeClr val="accent2"/>
                 </a:solidFill>
-                <a:effectLst>
-                  <a:outerShdw blurRad="38100" dist="25400" dir="5400000" algn="ctr" rotWithShape="0">
-                    <a:srgbClr val="6E747A">
-                      <a:alpha val="43000"/>
-                    </a:srgbClr>
-                  </a:outerShdw>
-                </a:effectLst>
               </a:rPr>
               <a:t>&lt;/title&gt;</a:t>
             </a:r>
@@ -18624,13 +18407,6 @@
                 <a:solidFill>
                   <a:schemeClr val="accent2"/>
                 </a:solidFill>
-                <a:effectLst>
-                  <a:outerShdw blurRad="38100" dist="25400" dir="5400000" algn="ctr" rotWithShape="0">
-                    <a:srgbClr val="6E747A">
-                      <a:alpha val="43000"/>
-                    </a:srgbClr>
-                  </a:outerShdw>
-                </a:effectLst>
               </a:rPr>
               <a:t>&lt;/Movie&gt;</a:t>
             </a:r>

</xml_diff>

<commit_message>
besprechung hammerschall, zwischenstand fixes
</commit_message>
<xml_diff>
--- a/images/ppt/graphics.pptx
+++ b/images/ppt/graphics.pptx
@@ -5247,216 +5247,231 @@
           <a:chExt cx="0" cy="0"/>
         </a:xfrm>
       </p:grpSpPr>
-      <p:sp>
-        <p:nvSpPr>
-          <p:cNvPr id="2" name="Gleichschenkliges Dreieck 1"/>
-          <p:cNvSpPr/>
+      <p:grpSp>
+        <p:nvGrpSpPr>
+          <p:cNvPr id="3" name="Gruppieren 2"/>
+          <p:cNvGrpSpPr/>
           <p:nvPr/>
-        </p:nvSpPr>
-        <p:spPr>
+        </p:nvGrpSpPr>
+        <p:grpSpPr>
           <a:xfrm>
-            <a:off x="1491418" y="773326"/>
-            <a:ext cx="6161164" cy="5311349"/>
+            <a:off x="835572" y="543149"/>
+            <a:ext cx="4359001" cy="3366699"/>
+            <a:chOff x="835572" y="543149"/>
+            <a:chExt cx="7472856" cy="5771702"/>
           </a:xfrm>
-          <a:prstGeom prst="triangle">
-            <a:avLst/>
-          </a:prstGeom>
-        </p:spPr>
-        <p:style>
-          <a:lnRef idx="2">
-            <a:schemeClr val="accent1">
-              <a:shade val="50000"/>
-            </a:schemeClr>
-          </a:lnRef>
-          <a:fillRef idx="1">
-            <a:schemeClr val="accent1"/>
-          </a:fillRef>
-          <a:effectRef idx="0">
-            <a:schemeClr val="accent1"/>
-          </a:effectRef>
-          <a:fontRef idx="minor">
-            <a:schemeClr val="lt1"/>
-          </a:fontRef>
-        </p:style>
-        <p:txBody>
-          <a:bodyPr rtlCol="0" anchor="ctr"/>
-          <a:lstStyle/>
-          <a:p>
-            <a:pPr algn="ctr"/>
-            <a:endParaRPr lang="de-DE" sz="6600" dirty="0"/>
-          </a:p>
-        </p:txBody>
-      </p:sp>
-      <p:sp>
-        <p:nvSpPr>
-          <p:cNvPr id="9" name="Abgerundetes Rechteck 8"/>
-          <p:cNvSpPr/>
-          <p:nvPr/>
-        </p:nvSpPr>
-        <p:spPr>
-          <a:xfrm>
-            <a:off x="3916152" y="543149"/>
-            <a:ext cx="1311691" cy="460353"/>
-          </a:xfrm>
-          <a:prstGeom prst="roundRect">
-            <a:avLst/>
-          </a:prstGeom>
-        </p:spPr>
-        <p:style>
-          <a:lnRef idx="2">
-            <a:schemeClr val="accent2">
-              <a:shade val="50000"/>
-            </a:schemeClr>
-          </a:lnRef>
-          <a:fillRef idx="1">
-            <a:schemeClr val="accent2"/>
-          </a:fillRef>
-          <a:effectRef idx="0">
-            <a:schemeClr val="accent2"/>
-          </a:effectRef>
-          <a:fontRef idx="minor">
-            <a:schemeClr val="lt1"/>
-          </a:fontRef>
-        </p:style>
-        <p:txBody>
-          <a:bodyPr rtlCol="0" anchor="ctr"/>
-          <a:lstStyle/>
-          <a:p>
-            <a:pPr algn="ctr"/>
-            <a:r>
-              <a:rPr lang="de-DE" dirty="0" smtClean="0"/>
-              <a:t>Leistung</a:t>
-            </a:r>
-            <a:endParaRPr lang="de-DE" dirty="0"/>
-          </a:p>
-        </p:txBody>
-      </p:sp>
-      <p:sp>
-        <p:nvSpPr>
-          <p:cNvPr id="10" name="Abgerundetes Rechteck 9"/>
-          <p:cNvSpPr/>
-          <p:nvPr/>
-        </p:nvSpPr>
-        <p:spPr>
-          <a:xfrm>
-            <a:off x="835572" y="5854498"/>
-            <a:ext cx="1311691" cy="460353"/>
-          </a:xfrm>
-          <a:prstGeom prst="roundRect">
-            <a:avLst/>
-          </a:prstGeom>
-        </p:spPr>
-        <p:style>
-          <a:lnRef idx="2">
-            <a:schemeClr val="accent2">
-              <a:shade val="50000"/>
-            </a:schemeClr>
-          </a:lnRef>
-          <a:fillRef idx="1">
-            <a:schemeClr val="accent2"/>
-          </a:fillRef>
-          <a:effectRef idx="0">
-            <a:schemeClr val="accent2"/>
-          </a:effectRef>
-          <a:fontRef idx="minor">
-            <a:schemeClr val="lt1"/>
-          </a:fontRef>
-        </p:style>
-        <p:txBody>
-          <a:bodyPr rtlCol="0" anchor="ctr"/>
-          <a:lstStyle/>
-          <a:p>
-            <a:pPr algn="ctr"/>
-            <a:r>
-              <a:rPr lang="de-DE" dirty="0" smtClean="0"/>
-              <a:t>Zeit</a:t>
-            </a:r>
-            <a:endParaRPr lang="de-DE" dirty="0"/>
-          </a:p>
-        </p:txBody>
-      </p:sp>
-      <p:sp>
-        <p:nvSpPr>
-          <p:cNvPr id="11" name="Abgerundetes Rechteck 10"/>
-          <p:cNvSpPr/>
-          <p:nvPr/>
-        </p:nvSpPr>
-        <p:spPr>
-          <a:xfrm>
-            <a:off x="6996737" y="5854498"/>
-            <a:ext cx="1311691" cy="460353"/>
-          </a:xfrm>
-          <a:prstGeom prst="roundRect">
-            <a:avLst/>
-          </a:prstGeom>
-        </p:spPr>
-        <p:style>
-          <a:lnRef idx="2">
-            <a:schemeClr val="accent2">
-              <a:shade val="50000"/>
-            </a:schemeClr>
-          </a:lnRef>
-          <a:fillRef idx="1">
-            <a:schemeClr val="accent2"/>
-          </a:fillRef>
-          <a:effectRef idx="0">
-            <a:schemeClr val="accent2"/>
-          </a:effectRef>
-          <a:fontRef idx="minor">
-            <a:schemeClr val="lt1"/>
-          </a:fontRef>
-        </p:style>
-        <p:txBody>
-          <a:bodyPr rtlCol="0" anchor="ctr"/>
-          <a:lstStyle/>
-          <a:p>
-            <a:pPr algn="ctr"/>
-            <a:r>
-              <a:rPr lang="de-DE" dirty="0" smtClean="0"/>
-              <a:t>Kosten</a:t>
-            </a:r>
-            <a:endParaRPr lang="de-DE" dirty="0"/>
-          </a:p>
-        </p:txBody>
-      </p:sp>
-      <p:sp>
-        <p:nvSpPr>
-          <p:cNvPr id="13" name="Textfeld 12"/>
-          <p:cNvSpPr txBox="1"/>
-          <p:nvPr/>
-        </p:nvSpPr>
-        <p:spPr>
-          <a:xfrm>
-            <a:off x="3255578" y="3529898"/>
-            <a:ext cx="2632841" cy="923330"/>
-          </a:xfrm>
-          <a:prstGeom prst="rect">
-            <a:avLst/>
-          </a:prstGeom>
-          <a:noFill/>
-        </p:spPr>
-        <p:txBody>
-          <a:bodyPr wrap="square" rtlCol="0">
-            <a:spAutoFit/>
-          </a:bodyPr>
-          <a:lstStyle/>
-          <a:p>
-            <a:r>
-              <a:rPr lang="de-DE" sz="5400" dirty="0" smtClean="0">
+        </p:grpSpPr>
+        <p:sp>
+          <p:nvSpPr>
+            <p:cNvPr id="2" name="Gleichschenkliges Dreieck 1"/>
+            <p:cNvSpPr/>
+            <p:nvPr/>
+          </p:nvSpPr>
+          <p:spPr>
+            <a:xfrm>
+              <a:off x="1491418" y="773326"/>
+              <a:ext cx="6161164" cy="5311349"/>
+            </a:xfrm>
+            <a:prstGeom prst="triangle">
+              <a:avLst/>
+            </a:prstGeom>
+          </p:spPr>
+          <p:style>
+            <a:lnRef idx="2">
+              <a:schemeClr val="accent1">
+                <a:shade val="50000"/>
+              </a:schemeClr>
+            </a:lnRef>
+            <a:fillRef idx="1">
+              <a:schemeClr val="accent1"/>
+            </a:fillRef>
+            <a:effectRef idx="0">
+              <a:schemeClr val="accent1"/>
+            </a:effectRef>
+            <a:fontRef idx="minor">
+              <a:schemeClr val="lt1"/>
+            </a:fontRef>
+          </p:style>
+          <p:txBody>
+            <a:bodyPr rtlCol="0" anchor="ctr"/>
+            <a:lstStyle/>
+            <a:p>
+              <a:pPr algn="ctr"/>
+              <a:endParaRPr lang="de-DE" sz="4800" dirty="0"/>
+            </a:p>
+          </p:txBody>
+        </p:sp>
+        <p:sp>
+          <p:nvSpPr>
+            <p:cNvPr id="9" name="Abgerundetes Rechteck 8"/>
+            <p:cNvSpPr/>
+            <p:nvPr/>
+          </p:nvSpPr>
+          <p:spPr>
+            <a:xfrm>
+              <a:off x="3916152" y="543149"/>
+              <a:ext cx="1311691" cy="460353"/>
+            </a:xfrm>
+            <a:prstGeom prst="roundRect">
+              <a:avLst/>
+            </a:prstGeom>
+          </p:spPr>
+          <p:style>
+            <a:lnRef idx="2">
+              <a:schemeClr val="accent2">
+                <a:shade val="50000"/>
+              </a:schemeClr>
+            </a:lnRef>
+            <a:fillRef idx="1">
+              <a:schemeClr val="accent2"/>
+            </a:fillRef>
+            <a:effectRef idx="0">
+              <a:schemeClr val="accent2"/>
+            </a:effectRef>
+            <a:fontRef idx="minor">
+              <a:schemeClr val="lt1"/>
+            </a:fontRef>
+          </p:style>
+          <p:txBody>
+            <a:bodyPr rtlCol="0" anchor="ctr"/>
+            <a:lstStyle/>
+            <a:p>
+              <a:pPr algn="ctr"/>
+              <a:r>
+                <a:rPr lang="de-DE" sz="1200" dirty="0" smtClean="0"/>
+                <a:t>Leistung</a:t>
+              </a:r>
+              <a:endParaRPr lang="de-DE" sz="1200" dirty="0"/>
+            </a:p>
+          </p:txBody>
+        </p:sp>
+        <p:sp>
+          <p:nvSpPr>
+            <p:cNvPr id="10" name="Abgerundetes Rechteck 9"/>
+            <p:cNvSpPr/>
+            <p:nvPr/>
+          </p:nvSpPr>
+          <p:spPr>
+            <a:xfrm>
+              <a:off x="835572" y="5854498"/>
+              <a:ext cx="1311691" cy="460353"/>
+            </a:xfrm>
+            <a:prstGeom prst="roundRect">
+              <a:avLst/>
+            </a:prstGeom>
+          </p:spPr>
+          <p:style>
+            <a:lnRef idx="2">
+              <a:schemeClr val="accent2">
+                <a:shade val="50000"/>
+              </a:schemeClr>
+            </a:lnRef>
+            <a:fillRef idx="1">
+              <a:schemeClr val="accent2"/>
+            </a:fillRef>
+            <a:effectRef idx="0">
+              <a:schemeClr val="accent2"/>
+            </a:effectRef>
+            <a:fontRef idx="minor">
+              <a:schemeClr val="lt1"/>
+            </a:fontRef>
+          </p:style>
+          <p:txBody>
+            <a:bodyPr rtlCol="0" anchor="ctr"/>
+            <a:lstStyle/>
+            <a:p>
+              <a:pPr algn="ctr"/>
+              <a:r>
+                <a:rPr lang="de-DE" sz="1200" dirty="0" smtClean="0"/>
+                <a:t>Zeit</a:t>
+              </a:r>
+              <a:endParaRPr lang="de-DE" sz="1200" dirty="0"/>
+            </a:p>
+          </p:txBody>
+        </p:sp>
+        <p:sp>
+          <p:nvSpPr>
+            <p:cNvPr id="11" name="Abgerundetes Rechteck 10"/>
+            <p:cNvSpPr/>
+            <p:nvPr/>
+          </p:nvSpPr>
+          <p:spPr>
+            <a:xfrm>
+              <a:off x="6996737" y="5854498"/>
+              <a:ext cx="1311691" cy="460353"/>
+            </a:xfrm>
+            <a:prstGeom prst="roundRect">
+              <a:avLst/>
+            </a:prstGeom>
+          </p:spPr>
+          <p:style>
+            <a:lnRef idx="2">
+              <a:schemeClr val="accent2">
+                <a:shade val="50000"/>
+              </a:schemeClr>
+            </a:lnRef>
+            <a:fillRef idx="1">
+              <a:schemeClr val="accent2"/>
+            </a:fillRef>
+            <a:effectRef idx="0">
+              <a:schemeClr val="accent2"/>
+            </a:effectRef>
+            <a:fontRef idx="minor">
+              <a:schemeClr val="lt1"/>
+            </a:fontRef>
+          </p:style>
+          <p:txBody>
+            <a:bodyPr rtlCol="0" anchor="ctr"/>
+            <a:lstStyle/>
+            <a:p>
+              <a:pPr algn="ctr"/>
+              <a:r>
+                <a:rPr lang="de-DE" sz="1200" dirty="0" smtClean="0"/>
+                <a:t>Kosten</a:t>
+              </a:r>
+              <a:endParaRPr lang="de-DE" sz="1200" dirty="0"/>
+            </a:p>
+          </p:txBody>
+        </p:sp>
+        <p:sp>
+          <p:nvSpPr>
+            <p:cNvPr id="13" name="Textfeld 12"/>
+            <p:cNvSpPr txBox="1"/>
+            <p:nvPr/>
+          </p:nvSpPr>
+          <p:spPr>
+            <a:xfrm>
+              <a:off x="3255578" y="3529897"/>
+              <a:ext cx="2632841" cy="896982"/>
+            </a:xfrm>
+            <a:prstGeom prst="rect">
+              <a:avLst/>
+            </a:prstGeom>
+            <a:noFill/>
+          </p:spPr>
+          <p:txBody>
+            <a:bodyPr wrap="square" rtlCol="0">
+              <a:spAutoFit/>
+            </a:bodyPr>
+            <a:lstStyle/>
+            <a:p>
+              <a:r>
+                <a:rPr lang="de-DE" sz="2800" dirty="0" smtClean="0">
+                  <a:solidFill>
+                    <a:schemeClr val="bg1"/>
+                  </a:solidFill>
+                </a:rPr>
+                <a:t>Qualität</a:t>
+              </a:r>
+              <a:endParaRPr lang="de-DE" sz="2800" dirty="0">
                 <a:solidFill>
                   <a:schemeClr val="bg1"/>
                 </a:solidFill>
-              </a:rPr>
-              <a:t>Qualität</a:t>
-            </a:r>
-            <a:endParaRPr lang="de-DE" sz="5400" dirty="0">
-              <a:solidFill>
-                <a:schemeClr val="bg1"/>
-              </a:solidFill>
-            </a:endParaRPr>
-          </a:p>
-        </p:txBody>
-      </p:sp>
+              </a:endParaRPr>
+            </a:p>
+          </p:txBody>
+        </p:sp>
+      </p:grpSp>
     </p:spTree>
     <p:extLst>
       <p:ext uri="{BB962C8B-B14F-4D97-AF65-F5344CB8AC3E}">
@@ -20124,7 +20139,6 @@
                 <a:rPr lang="de-DE" dirty="0"/>
                 <a:t>Bestellung storniert</a:t>
               </a:r>
-              <a:endParaRPr lang="de-DE" dirty="0"/>
             </a:p>
           </p:txBody>
         </p:sp>
@@ -20715,7 +20729,6 @@
                 <a:rPr lang="de-DE" dirty="0"/>
                 <a:t>3</a:t>
               </a:r>
-              <a:endParaRPr lang="de-DE" dirty="0"/>
             </a:p>
           </p:txBody>
         </p:sp>
@@ -22824,8 +22837,8 @@
         </p:nvSpPr>
         <p:spPr>
           <a:xfrm rot="18900000">
-            <a:off x="446497" y="5862115"/>
-            <a:ext cx="790601" cy="276999"/>
+            <a:off x="457718" y="5862115"/>
+            <a:ext cx="768159" cy="276999"/>
           </a:xfrm>
           <a:prstGeom prst="rect">
             <a:avLst/>
@@ -22839,12 +22852,20 @@
           <a:lstStyle/>
           <a:p>
             <a:r>
+              <a:rPr lang="de-DE" sz="1200" dirty="0" err="1" smtClean="0">
+                <a:solidFill>
+                  <a:schemeClr val="bg1"/>
+                </a:solidFill>
+              </a:rPr>
+              <a:t>Komp</a:t>
+            </a:r>
+            <a:r>
               <a:rPr lang="de-DE" sz="1200" dirty="0" smtClean="0">
                 <a:solidFill>
                   <a:schemeClr val="bg1"/>
                 </a:solidFill>
               </a:rPr>
-              <a:t>Service A</a:t>
+              <a:t>. A</a:t>
             </a:r>
             <a:endParaRPr lang="de-DE" sz="1200" dirty="0">
               <a:solidFill>
@@ -22862,8 +22883,8 @@
         </p:nvSpPr>
         <p:spPr>
           <a:xfrm rot="18900000">
-            <a:off x="1152871" y="5861962"/>
-            <a:ext cx="790601" cy="276999"/>
+            <a:off x="1164092" y="5861962"/>
+            <a:ext cx="768159" cy="276999"/>
           </a:xfrm>
           <a:prstGeom prst="rect">
             <a:avLst/>
@@ -22877,12 +22898,20 @@
           <a:lstStyle/>
           <a:p>
             <a:r>
+              <a:rPr lang="de-DE" sz="1200" dirty="0" err="1" smtClean="0">
+                <a:solidFill>
+                  <a:schemeClr val="bg1"/>
+                </a:solidFill>
+              </a:rPr>
+              <a:t>Komp</a:t>
+            </a:r>
+            <a:r>
               <a:rPr lang="de-DE" sz="1200" dirty="0" smtClean="0">
                 <a:solidFill>
                   <a:schemeClr val="bg1"/>
                 </a:solidFill>
               </a:rPr>
-              <a:t>Service B</a:t>
+              <a:t>. B</a:t>
             </a:r>
             <a:endParaRPr lang="de-DE" sz="1200" dirty="0">
               <a:solidFill>
@@ -22900,8 +22929,8 @@
         </p:nvSpPr>
         <p:spPr>
           <a:xfrm rot="18900000">
-            <a:off x="1857500" y="5870850"/>
-            <a:ext cx="785793" cy="276999"/>
+            <a:off x="1868722" y="5870850"/>
+            <a:ext cx="763351" cy="276999"/>
           </a:xfrm>
           <a:prstGeom prst="rect">
             <a:avLst/>
@@ -22915,12 +22944,20 @@
           <a:lstStyle/>
           <a:p>
             <a:r>
+              <a:rPr lang="de-DE" sz="1200" dirty="0" err="1" smtClean="0">
+                <a:solidFill>
+                  <a:schemeClr val="bg1"/>
+                </a:solidFill>
+              </a:rPr>
+              <a:t>Komp</a:t>
+            </a:r>
+            <a:r>
               <a:rPr lang="de-DE" sz="1200" dirty="0" smtClean="0">
                 <a:solidFill>
                   <a:schemeClr val="bg1"/>
                 </a:solidFill>
               </a:rPr>
-              <a:t>Service C</a:t>
+              <a:t>. C</a:t>
             </a:r>
             <a:endParaRPr lang="de-DE" sz="1200" dirty="0">
               <a:solidFill>
@@ -22938,8 +22975,8 @@
         </p:nvSpPr>
         <p:spPr>
           <a:xfrm rot="18900000">
-            <a:off x="3424620" y="5886291"/>
-            <a:ext cx="790601" cy="276999"/>
+            <a:off x="3435841" y="5886291"/>
+            <a:ext cx="768159" cy="276999"/>
           </a:xfrm>
           <a:prstGeom prst="rect">
             <a:avLst/>
@@ -22953,12 +22990,20 @@
           <a:lstStyle/>
           <a:p>
             <a:r>
+              <a:rPr lang="de-DE" sz="1200" dirty="0" err="1" smtClean="0">
+                <a:solidFill>
+                  <a:schemeClr val="bg1"/>
+                </a:solidFill>
+              </a:rPr>
+              <a:t>Komp</a:t>
+            </a:r>
+            <a:r>
               <a:rPr lang="de-DE" sz="1200" dirty="0" smtClean="0">
                 <a:solidFill>
                   <a:schemeClr val="bg1"/>
                 </a:solidFill>
               </a:rPr>
-              <a:t>Service A</a:t>
+              <a:t>. A</a:t>
             </a:r>
             <a:endParaRPr lang="de-DE" sz="1200" dirty="0">
               <a:solidFill>
@@ -22976,8 +23021,8 @@
         </p:nvSpPr>
         <p:spPr>
           <a:xfrm rot="18900000">
-            <a:off x="4130994" y="5886138"/>
-            <a:ext cx="790601" cy="276999"/>
+            <a:off x="4142215" y="5886138"/>
+            <a:ext cx="768159" cy="276999"/>
           </a:xfrm>
           <a:prstGeom prst="rect">
             <a:avLst/>
@@ -22991,12 +23036,20 @@
           <a:lstStyle/>
           <a:p>
             <a:r>
+              <a:rPr lang="de-DE" sz="1200" dirty="0" err="1" smtClean="0">
+                <a:solidFill>
+                  <a:schemeClr val="bg1"/>
+                </a:solidFill>
+              </a:rPr>
+              <a:t>Komp</a:t>
+            </a:r>
+            <a:r>
               <a:rPr lang="de-DE" sz="1200" dirty="0" smtClean="0">
                 <a:solidFill>
                   <a:schemeClr val="bg1"/>
                 </a:solidFill>
               </a:rPr>
-              <a:t>Service B</a:t>
+              <a:t>. B</a:t>
             </a:r>
             <a:endParaRPr lang="de-DE" sz="1200" dirty="0">
               <a:solidFill>
@@ -23014,8 +23067,8 @@
         </p:nvSpPr>
         <p:spPr>
           <a:xfrm rot="18900000">
-            <a:off x="4835623" y="5895026"/>
-            <a:ext cx="785793" cy="276999"/>
+            <a:off x="4846845" y="5895026"/>
+            <a:ext cx="763351" cy="276999"/>
           </a:xfrm>
           <a:prstGeom prst="rect">
             <a:avLst/>
@@ -23029,12 +23082,20 @@
           <a:lstStyle/>
           <a:p>
             <a:r>
+              <a:rPr lang="de-DE" sz="1200" dirty="0" err="1" smtClean="0">
+                <a:solidFill>
+                  <a:schemeClr val="bg1"/>
+                </a:solidFill>
+              </a:rPr>
+              <a:t>Komp</a:t>
+            </a:r>
+            <a:r>
               <a:rPr lang="de-DE" sz="1200" dirty="0" smtClean="0">
                 <a:solidFill>
                   <a:schemeClr val="bg1"/>
                 </a:solidFill>
               </a:rPr>
-              <a:t>Service C</a:t>
+              <a:t>. C</a:t>
             </a:r>
             <a:endParaRPr lang="de-DE" sz="1200" dirty="0">
               <a:solidFill>
@@ -23052,8 +23113,8 @@
         </p:nvSpPr>
         <p:spPr>
           <a:xfrm rot="18900000">
-            <a:off x="6508915" y="5866012"/>
-            <a:ext cx="790601" cy="276999"/>
+            <a:off x="6520136" y="5866012"/>
+            <a:ext cx="768159" cy="276999"/>
           </a:xfrm>
           <a:prstGeom prst="rect">
             <a:avLst/>
@@ -23067,12 +23128,20 @@
           <a:lstStyle/>
           <a:p>
             <a:r>
+              <a:rPr lang="de-DE" sz="1200" dirty="0" err="1" smtClean="0">
+                <a:solidFill>
+                  <a:schemeClr val="bg1"/>
+                </a:solidFill>
+              </a:rPr>
+              <a:t>Komp</a:t>
+            </a:r>
+            <a:r>
               <a:rPr lang="de-DE" sz="1200" dirty="0" smtClean="0">
                 <a:solidFill>
                   <a:schemeClr val="bg1"/>
                 </a:solidFill>
               </a:rPr>
-              <a:t>Service A</a:t>
+              <a:t>. A</a:t>
             </a:r>
             <a:endParaRPr lang="de-DE" sz="1200" dirty="0">
               <a:solidFill>
@@ -23090,8 +23159,8 @@
         </p:nvSpPr>
         <p:spPr>
           <a:xfrm rot="18900000">
-            <a:off x="7215289" y="5865859"/>
-            <a:ext cx="790601" cy="276999"/>
+            <a:off x="7226510" y="5865859"/>
+            <a:ext cx="768159" cy="276999"/>
           </a:xfrm>
           <a:prstGeom prst="rect">
             <a:avLst/>
@@ -23105,12 +23174,20 @@
           <a:lstStyle/>
           <a:p>
             <a:r>
+              <a:rPr lang="de-DE" sz="1200" dirty="0" err="1" smtClean="0">
+                <a:solidFill>
+                  <a:schemeClr val="bg1"/>
+                </a:solidFill>
+              </a:rPr>
+              <a:t>Komp</a:t>
+            </a:r>
+            <a:r>
               <a:rPr lang="de-DE" sz="1200" dirty="0" smtClean="0">
                 <a:solidFill>
                   <a:schemeClr val="bg1"/>
                 </a:solidFill>
               </a:rPr>
-              <a:t>Service B</a:t>
+              <a:t>. B</a:t>
             </a:r>
             <a:endParaRPr lang="de-DE" sz="1200" dirty="0">
               <a:solidFill>
@@ -23128,8 +23205,8 @@
         </p:nvSpPr>
         <p:spPr>
           <a:xfrm rot="18900000">
-            <a:off x="7919918" y="5874747"/>
-            <a:ext cx="785793" cy="276999"/>
+            <a:off x="7931140" y="5874747"/>
+            <a:ext cx="763351" cy="276999"/>
           </a:xfrm>
           <a:prstGeom prst="rect">
             <a:avLst/>
@@ -23143,12 +23220,20 @@
           <a:lstStyle/>
           <a:p>
             <a:r>
+              <a:rPr lang="de-DE" sz="1200" dirty="0" err="1" smtClean="0">
+                <a:solidFill>
+                  <a:schemeClr val="bg1"/>
+                </a:solidFill>
+              </a:rPr>
+              <a:t>Komp</a:t>
+            </a:r>
+            <a:r>
               <a:rPr lang="de-DE" sz="1200" dirty="0" smtClean="0">
                 <a:solidFill>
                   <a:schemeClr val="bg1"/>
                 </a:solidFill>
               </a:rPr>
-              <a:t>Service C</a:t>
+              <a:t>. C</a:t>
             </a:r>
             <a:endParaRPr lang="de-DE" sz="1200" dirty="0">
               <a:solidFill>

</xml_diff>